<commit_message>
new api version + new video
</commit_message>
<xml_diff>
--- a/googleTasks.pptx
+++ b/googleTasks.pptx
@@ -17,7 +17,11 @@
     <p:sldId id="268" r:id="rId11"/>
     <p:sldId id="269" r:id="rId12"/>
     <p:sldId id="256" r:id="rId13"/>
-    <p:sldId id="270" r:id="rId14"/>
+    <p:sldId id="271" r:id="rId14"/>
+    <p:sldId id="272" r:id="rId15"/>
+    <p:sldId id="273" r:id="rId16"/>
+    <p:sldId id="274" r:id="rId17"/>
+    <p:sldId id="270" r:id="rId18"/>
   </p:sldIdLst>
   <p:sldSz cx="9144000" cy="6858000" type="screen4x3"/>
   <p:notesSz cx="6858000" cy="9144000"/>
@@ -116,6 +120,11 @@
       </a:defRPr>
     </a:lvl9pPr>
   </p:defaultTextStyle>
+  <p:extLst>
+    <p:ext uri="{EFAFB233-063F-42B5-8137-9DF3F51BA10A}">
+      <p15:sldGuideLst xmlns:p15="http://schemas.microsoft.com/office/powerpoint/2012/main"/>
+    </p:ext>
+  </p:extLst>
 </p:presentation>
 </file>
 
@@ -738,7 +747,7 @@
           <a:p>
             <a:fld id="{91F5A9ED-CE8C-49CB-9333-73405333B65B}" type="datetimeFigureOut">
               <a:rPr lang="pl-PL" smtClean="0"/>
-              <a:t>05.06.2023</a:t>
+              <a:t>07.07.2023</a:t>
             </a:fld>
             <a:endParaRPr lang="pl-PL"/>
           </a:p>
@@ -908,7 +917,7 @@
           <a:p>
             <a:fld id="{91F5A9ED-CE8C-49CB-9333-73405333B65B}" type="datetimeFigureOut">
               <a:rPr lang="pl-PL" smtClean="0"/>
-              <a:t>05.06.2023</a:t>
+              <a:t>07.07.2023</a:t>
             </a:fld>
             <a:endParaRPr lang="pl-PL"/>
           </a:p>
@@ -1088,7 +1097,7 @@
           <a:p>
             <a:fld id="{91F5A9ED-CE8C-49CB-9333-73405333B65B}" type="datetimeFigureOut">
               <a:rPr lang="pl-PL" smtClean="0"/>
-              <a:t>05.06.2023</a:t>
+              <a:t>07.07.2023</a:t>
             </a:fld>
             <a:endParaRPr lang="pl-PL"/>
           </a:p>
@@ -1258,7 +1267,7 @@
           <a:p>
             <a:fld id="{91F5A9ED-CE8C-49CB-9333-73405333B65B}" type="datetimeFigureOut">
               <a:rPr lang="pl-PL" smtClean="0"/>
-              <a:t>05.06.2023</a:t>
+              <a:t>07.07.2023</a:t>
             </a:fld>
             <a:endParaRPr lang="pl-PL"/>
           </a:p>
@@ -1502,7 +1511,7 @@
           <a:p>
             <a:fld id="{91F5A9ED-CE8C-49CB-9333-73405333B65B}" type="datetimeFigureOut">
               <a:rPr lang="pl-PL" smtClean="0"/>
-              <a:t>05.06.2023</a:t>
+              <a:t>07.07.2023</a:t>
             </a:fld>
             <a:endParaRPr lang="pl-PL"/>
           </a:p>
@@ -1734,7 +1743,7 @@
           <a:p>
             <a:fld id="{91F5A9ED-CE8C-49CB-9333-73405333B65B}" type="datetimeFigureOut">
               <a:rPr lang="pl-PL" smtClean="0"/>
-              <a:t>05.06.2023</a:t>
+              <a:t>07.07.2023</a:t>
             </a:fld>
             <a:endParaRPr lang="pl-PL"/>
           </a:p>
@@ -2101,7 +2110,7 @@
           <a:p>
             <a:fld id="{91F5A9ED-CE8C-49CB-9333-73405333B65B}" type="datetimeFigureOut">
               <a:rPr lang="pl-PL" smtClean="0"/>
-              <a:t>05.06.2023</a:t>
+              <a:t>07.07.2023</a:t>
             </a:fld>
             <a:endParaRPr lang="pl-PL"/>
           </a:p>
@@ -2219,7 +2228,7 @@
           <a:p>
             <a:fld id="{91F5A9ED-CE8C-49CB-9333-73405333B65B}" type="datetimeFigureOut">
               <a:rPr lang="pl-PL" smtClean="0"/>
-              <a:t>05.06.2023</a:t>
+              <a:t>07.07.2023</a:t>
             </a:fld>
             <a:endParaRPr lang="pl-PL"/>
           </a:p>
@@ -2314,7 +2323,7 @@
           <a:p>
             <a:fld id="{91F5A9ED-CE8C-49CB-9333-73405333B65B}" type="datetimeFigureOut">
               <a:rPr lang="pl-PL" smtClean="0"/>
-              <a:t>05.06.2023</a:t>
+              <a:t>07.07.2023</a:t>
             </a:fld>
             <a:endParaRPr lang="pl-PL"/>
           </a:p>
@@ -2591,7 +2600,7 @@
           <a:p>
             <a:fld id="{91F5A9ED-CE8C-49CB-9333-73405333B65B}" type="datetimeFigureOut">
               <a:rPr lang="pl-PL" smtClean="0"/>
-              <a:t>05.06.2023</a:t>
+              <a:t>07.07.2023</a:t>
             </a:fld>
             <a:endParaRPr lang="pl-PL"/>
           </a:p>
@@ -2848,7 +2857,7 @@
           <a:p>
             <a:fld id="{91F5A9ED-CE8C-49CB-9333-73405333B65B}" type="datetimeFigureOut">
               <a:rPr lang="pl-PL" smtClean="0"/>
-              <a:t>05.06.2023</a:t>
+              <a:t>07.07.2023</a:t>
             </a:fld>
             <a:endParaRPr lang="pl-PL"/>
           </a:p>
@@ -3061,7 +3070,7 @@
           <a:p>
             <a:fld id="{91F5A9ED-CE8C-49CB-9333-73405333B65B}" type="datetimeFigureOut">
               <a:rPr lang="pl-PL" smtClean="0"/>
-              <a:t>05.06.2023</a:t>
+              <a:t>07.07.2023</a:t>
             </a:fld>
             <a:endParaRPr lang="pl-PL"/>
           </a:p>
@@ -3627,7 +3636,7 @@
         </p:nvSpPr>
         <p:spPr>
           <a:xfrm>
-            <a:off x="-575310" y="418466"/>
+            <a:off x="120814" y="129398"/>
             <a:ext cx="7886700" cy="1325563"/>
           </a:xfrm>
         </p:spPr>
@@ -3635,7 +3644,10 @@
           <a:bodyPr/>
           <a:lstStyle/>
           <a:p>
-            <a:endParaRPr lang="pl-PL" dirty="0"/>
+            <a:r>
+              <a:rPr lang="pl-PL" dirty="0"/>
+              <a:t>Smartwatch demo</a:t>
+            </a:r>
           </a:p>
         </p:txBody>
       </p:sp>
@@ -3711,13 +3723,11 @@
             </a:extLst>
           </a:blip>
           <a:srcRect/>
-          <a:stretch>
-            <a:fillRect/>
-          </a:stretch>
+          <a:stretch/>
         </p:blipFill>
         <p:spPr bwMode="auto">
           <a:xfrm>
-            <a:off x="1205865" y="1320165"/>
+            <a:off x="628650" y="1744919"/>
             <a:ext cx="4324350" cy="4324350"/>
           </a:xfrm>
           <a:prstGeom prst="rect">
@@ -3781,12 +3791,20 @@
             <p:ph type="title"/>
           </p:nvPr>
         </p:nvSpPr>
-        <p:spPr/>
+        <p:spPr>
+          <a:xfrm>
+            <a:off x="121306" y="199548"/>
+            <a:ext cx="7886700" cy="1325563"/>
+          </a:xfrm>
+        </p:spPr>
         <p:txBody>
           <a:bodyPr/>
           <a:lstStyle/>
           <a:p>
-            <a:endParaRPr lang="pl-PL"/>
+            <a:r>
+              <a:rPr lang="pl-PL" dirty="0"/>
+              <a:t>Smartwatch demo</a:t>
+            </a:r>
           </a:p>
         </p:txBody>
       </p:sp>
@@ -4460,6 +4478,1788 @@
           <p:cNvPr id="2" name="Title 1">
             <a:extLst>
               <a:ext uri="{FF2B5EF4-FFF2-40B4-BE49-F238E27FC236}">
+                <a16:creationId xmlns:a16="http://schemas.microsoft.com/office/drawing/2014/main" id="{BF505A78-6065-B07E-ADE1-4F3146545FE3}"/>
+              </a:ext>
+            </a:extLst>
+          </p:cNvPr>
+          <p:cNvSpPr>
+            <a:spLocks noGrp="1"/>
+          </p:cNvSpPr>
+          <p:nvPr>
+            <p:ph type="title"/>
+          </p:nvPr>
+        </p:nvSpPr>
+        <p:spPr>
+          <a:xfrm>
+            <a:off x="120814" y="129398"/>
+            <a:ext cx="7886700" cy="1325563"/>
+          </a:xfrm>
+        </p:spPr>
+        <p:txBody>
+          <a:bodyPr/>
+          <a:lstStyle/>
+          <a:p>
+            <a:r>
+              <a:rPr lang="pl-PL" dirty="0"/>
+              <a:t>Application </a:t>
+            </a:r>
+            <a:r>
+              <a:rPr lang="pl-PL" dirty="0" err="1"/>
+              <a:t>flow</a:t>
+            </a:r>
+            <a:r>
+              <a:rPr lang="pl-PL" dirty="0"/>
+              <a:t> for data </a:t>
+            </a:r>
+            <a:r>
+              <a:rPr lang="pl-PL" dirty="0" err="1"/>
+              <a:t>scopes</a:t>
+            </a:r>
+            <a:endParaRPr lang="pl-PL" dirty="0"/>
+          </a:p>
+        </p:txBody>
+      </p:sp>
+      <p:sp>
+        <p:nvSpPr>
+          <p:cNvPr id="3" name="Content Placeholder 2">
+            <a:extLst>
+              <a:ext uri="{FF2B5EF4-FFF2-40B4-BE49-F238E27FC236}">
+                <a16:creationId xmlns:a16="http://schemas.microsoft.com/office/drawing/2014/main" id="{B34717E9-3F5A-855A-B39B-D164B1FC795E}"/>
+              </a:ext>
+            </a:extLst>
+          </p:cNvPr>
+          <p:cNvSpPr>
+            <a:spLocks noGrp="1"/>
+          </p:cNvSpPr>
+          <p:nvPr>
+            <p:ph idx="1"/>
+          </p:nvPr>
+        </p:nvSpPr>
+        <p:spPr>
+          <a:xfrm>
+            <a:off x="4831571" y="1206193"/>
+            <a:ext cx="3970266" cy="5589864"/>
+          </a:xfrm>
+        </p:spPr>
+        <p:txBody>
+          <a:bodyPr>
+            <a:normAutofit fontScale="92500" lnSpcReduction="10000"/>
+          </a:bodyPr>
+          <a:lstStyle/>
+          <a:p>
+            <a:pPr marL="0" indent="0">
+              <a:buNone/>
+            </a:pPr>
+            <a:r>
+              <a:rPr lang="pl-PL" sz="2400" dirty="0" err="1"/>
+              <a:t>This</a:t>
+            </a:r>
+            <a:r>
+              <a:rPr lang="pl-PL" sz="2400" dirty="0"/>
+              <a:t> </a:t>
+            </a:r>
+            <a:r>
+              <a:rPr lang="pl-PL" sz="2400" dirty="0" err="1"/>
+              <a:t>is</a:t>
+            </a:r>
+            <a:r>
+              <a:rPr lang="pl-PL" sz="2400" dirty="0"/>
+              <a:t> </a:t>
+            </a:r>
+            <a:r>
+              <a:rPr lang="pl-PL" sz="2400" dirty="0" err="1"/>
+              <a:t>main</a:t>
+            </a:r>
+            <a:r>
+              <a:rPr lang="pl-PL" sz="2400" dirty="0"/>
+              <a:t> </a:t>
+            </a:r>
+            <a:r>
+              <a:rPr lang="pl-PL" sz="2400" dirty="0" err="1"/>
+              <a:t>screen</a:t>
+            </a:r>
+            <a:r>
+              <a:rPr lang="pl-PL" sz="2400" dirty="0"/>
+              <a:t> of the </a:t>
+            </a:r>
+            <a:r>
+              <a:rPr lang="pl-PL" sz="2400" dirty="0" err="1"/>
+              <a:t>application</a:t>
+            </a:r>
+            <a:r>
+              <a:rPr lang="pl-PL" sz="2400" dirty="0"/>
+              <a:t> </a:t>
+            </a:r>
+            <a:r>
+              <a:rPr lang="pl-PL" sz="2400" dirty="0" err="1"/>
+              <a:t>called</a:t>
+            </a:r>
+            <a:r>
+              <a:rPr lang="pl-PL" sz="2400" dirty="0"/>
+              <a:t> „</a:t>
+            </a:r>
+            <a:r>
+              <a:rPr lang="pl-PL" sz="2400" dirty="0" err="1"/>
+              <a:t>Lists</a:t>
+            </a:r>
+            <a:r>
+              <a:rPr lang="pl-PL" sz="2400" dirty="0"/>
+              <a:t>”.</a:t>
+            </a:r>
+          </a:p>
+          <a:p>
+            <a:pPr marL="0" indent="0">
+              <a:buNone/>
+            </a:pPr>
+            <a:r>
+              <a:rPr lang="pl-PL" sz="2400" dirty="0" err="1"/>
+              <a:t>During</a:t>
+            </a:r>
+            <a:r>
+              <a:rPr lang="pl-PL" sz="2400" dirty="0"/>
+              <a:t> start </a:t>
+            </a:r>
+            <a:r>
+              <a:rPr lang="pl-PL" sz="2400" dirty="0" err="1"/>
+              <a:t>it</a:t>
+            </a:r>
+            <a:r>
+              <a:rPr lang="pl-PL" sz="2400" dirty="0"/>
+              <a:t> </a:t>
+            </a:r>
+            <a:r>
+              <a:rPr lang="pl-PL" sz="2400" dirty="0" err="1"/>
+              <a:t>will</a:t>
+            </a:r>
+            <a:r>
+              <a:rPr lang="pl-PL" sz="2400" dirty="0"/>
+              <a:t> </a:t>
+            </a:r>
+            <a:r>
+              <a:rPr lang="pl-PL" sz="2400" dirty="0" err="1"/>
+              <a:t>call</a:t>
+            </a:r>
+            <a:r>
+              <a:rPr lang="pl-PL" sz="2400" dirty="0"/>
+              <a:t> </a:t>
+            </a:r>
+            <a:r>
+              <a:rPr lang="pl-PL" sz="2400" b="1" dirty="0"/>
+              <a:t>Google </a:t>
+            </a:r>
+            <a:r>
+              <a:rPr lang="pl-PL" sz="2400" b="1" dirty="0" err="1"/>
+              <a:t>Tasks</a:t>
+            </a:r>
+            <a:r>
+              <a:rPr lang="pl-PL" sz="2400" b="1" dirty="0"/>
+              <a:t> </a:t>
+            </a:r>
+            <a:r>
+              <a:rPr lang="pl-PL" sz="2400" b="1" dirty="0" err="1"/>
+              <a:t>api</a:t>
+            </a:r>
+            <a:r>
+              <a:rPr lang="pl-PL" sz="2400" dirty="0"/>
+              <a:t> and display </a:t>
+            </a:r>
+            <a:r>
+              <a:rPr lang="pl-PL" sz="2400" dirty="0" err="1"/>
+              <a:t>all</a:t>
+            </a:r>
+            <a:r>
+              <a:rPr lang="pl-PL" sz="2400" dirty="0"/>
+              <a:t> </a:t>
+            </a:r>
+            <a:r>
+              <a:rPr lang="pl-PL" sz="2400" dirty="0" err="1"/>
+              <a:t>lists</a:t>
+            </a:r>
+            <a:r>
+              <a:rPr lang="pl-PL" sz="2400" dirty="0"/>
+              <a:t> </a:t>
+            </a:r>
+            <a:r>
+              <a:rPr lang="pl-PL" sz="2400" dirty="0" err="1"/>
+              <a:t>assigned</a:t>
+            </a:r>
+            <a:r>
+              <a:rPr lang="pl-PL" sz="2400" dirty="0"/>
+              <a:t> to </a:t>
+            </a:r>
+            <a:r>
+              <a:rPr lang="pl-PL" sz="2400" dirty="0" err="1"/>
+              <a:t>user</a:t>
+            </a:r>
+            <a:r>
+              <a:rPr lang="pl-PL" sz="2400" dirty="0"/>
+              <a:t>. </a:t>
+            </a:r>
+            <a:r>
+              <a:rPr lang="pl-PL" sz="2400" dirty="0" err="1"/>
+              <a:t>Lists</a:t>
+            </a:r>
+            <a:r>
+              <a:rPr lang="pl-PL" sz="2400" dirty="0"/>
+              <a:t> </a:t>
+            </a:r>
+            <a:r>
+              <a:rPr lang="pl-PL" sz="2400" dirty="0" err="1"/>
+              <a:t>are</a:t>
+            </a:r>
+            <a:r>
+              <a:rPr lang="pl-PL" sz="2400" dirty="0"/>
+              <a:t> </a:t>
+            </a:r>
+            <a:r>
+              <a:rPr lang="pl-PL" sz="2400" dirty="0" err="1"/>
+              <a:t>saved</a:t>
+            </a:r>
+            <a:r>
+              <a:rPr lang="pl-PL" sz="2400" dirty="0"/>
+              <a:t> </a:t>
+            </a:r>
+            <a:r>
+              <a:rPr lang="pl-PL" sz="2400" dirty="0" err="1"/>
+              <a:t>into</a:t>
+            </a:r>
+            <a:r>
+              <a:rPr lang="pl-PL" sz="2400" dirty="0"/>
+              <a:t> </a:t>
+            </a:r>
+            <a:r>
+              <a:rPr lang="pl-PL" sz="2400" dirty="0" err="1"/>
+              <a:t>watch</a:t>
+            </a:r>
+            <a:r>
+              <a:rPr lang="pl-PL" sz="2400" dirty="0"/>
+              <a:t> as cache. </a:t>
+            </a:r>
+            <a:r>
+              <a:rPr lang="pl-PL" sz="2400" dirty="0" err="1"/>
+              <a:t>Initially</a:t>
+            </a:r>
+            <a:r>
+              <a:rPr lang="pl-PL" sz="2400" dirty="0"/>
+              <a:t> </a:t>
+            </a:r>
+            <a:r>
+              <a:rPr lang="pl-PL" sz="2400" dirty="0" err="1"/>
+              <a:t>application</a:t>
+            </a:r>
+            <a:r>
+              <a:rPr lang="pl-PL" sz="2400" dirty="0"/>
+              <a:t> display </a:t>
+            </a:r>
+            <a:r>
+              <a:rPr lang="pl-PL" sz="2400" dirty="0" err="1"/>
+              <a:t>saved</a:t>
+            </a:r>
+            <a:r>
+              <a:rPr lang="pl-PL" sz="2400" dirty="0"/>
+              <a:t> </a:t>
+            </a:r>
+            <a:r>
+              <a:rPr lang="pl-PL" sz="2400" dirty="0" err="1"/>
+              <a:t>lists</a:t>
+            </a:r>
+            <a:r>
+              <a:rPr lang="pl-PL" sz="2400" dirty="0"/>
+              <a:t>(on the top </a:t>
+            </a:r>
+            <a:r>
+              <a:rPr lang="pl-PL" sz="2400" dirty="0" err="1"/>
+              <a:t>user</a:t>
+            </a:r>
+            <a:r>
+              <a:rPr lang="pl-PL" sz="2400" dirty="0"/>
+              <a:t> </a:t>
+            </a:r>
+            <a:r>
+              <a:rPr lang="pl-PL" sz="2400" dirty="0" err="1"/>
+              <a:t>see</a:t>
+            </a:r>
+            <a:r>
+              <a:rPr lang="pl-PL" sz="2400" dirty="0"/>
+              <a:t> </a:t>
+            </a:r>
+            <a:r>
+              <a:rPr lang="pl-PL" sz="2400" dirty="0" err="1"/>
+              <a:t>word</a:t>
+            </a:r>
+            <a:r>
+              <a:rPr lang="pl-PL" sz="2400" dirty="0"/>
+              <a:t> „cache”), </a:t>
+            </a:r>
+            <a:r>
+              <a:rPr lang="pl-PL" sz="2400" dirty="0" err="1"/>
+              <a:t>when</a:t>
+            </a:r>
+            <a:r>
+              <a:rPr lang="pl-PL" sz="2400" dirty="0"/>
+              <a:t> </a:t>
+            </a:r>
+            <a:r>
+              <a:rPr lang="pl-PL" sz="2400" b="1" dirty="0"/>
+              <a:t>Google </a:t>
+            </a:r>
+            <a:r>
+              <a:rPr lang="pl-PL" sz="2400" b="1" dirty="0" err="1"/>
+              <a:t>Tasks</a:t>
+            </a:r>
+            <a:r>
+              <a:rPr lang="pl-PL" sz="2400" b="1" dirty="0"/>
+              <a:t> </a:t>
+            </a:r>
+            <a:r>
+              <a:rPr lang="pl-PL" sz="2400" b="1" dirty="0" err="1"/>
+              <a:t>api</a:t>
+            </a:r>
+            <a:r>
+              <a:rPr lang="pl-PL" sz="2400" dirty="0"/>
+              <a:t> </a:t>
+            </a:r>
+            <a:r>
+              <a:rPr lang="pl-PL" sz="2400" dirty="0" err="1"/>
+              <a:t>call</a:t>
+            </a:r>
+            <a:r>
+              <a:rPr lang="pl-PL" sz="2400" dirty="0"/>
+              <a:t> </a:t>
+            </a:r>
+            <a:r>
+              <a:rPr lang="pl-PL" sz="2400" dirty="0" err="1"/>
+              <a:t>will</a:t>
+            </a:r>
+            <a:r>
+              <a:rPr lang="pl-PL" sz="2400" dirty="0"/>
+              <a:t> </a:t>
+            </a:r>
+            <a:r>
+              <a:rPr lang="pl-PL" sz="2400" dirty="0" err="1"/>
+              <a:t>finish</a:t>
+            </a:r>
+            <a:r>
+              <a:rPr lang="pl-PL" sz="2400" dirty="0"/>
+              <a:t> </a:t>
+            </a:r>
+            <a:r>
+              <a:rPr lang="pl-PL" sz="2400" dirty="0" err="1"/>
+              <a:t>screen</a:t>
+            </a:r>
+            <a:r>
+              <a:rPr lang="pl-PL" sz="2400" dirty="0"/>
+              <a:t> </a:t>
+            </a:r>
+            <a:r>
+              <a:rPr lang="pl-PL" sz="2400" dirty="0" err="1"/>
+              <a:t>will</a:t>
+            </a:r>
+            <a:r>
+              <a:rPr lang="pl-PL" sz="2400" dirty="0"/>
+              <a:t> display </a:t>
+            </a:r>
+            <a:r>
+              <a:rPr lang="pl-PL" sz="2400" dirty="0" err="1"/>
+              <a:t>result</a:t>
+            </a:r>
+            <a:r>
+              <a:rPr lang="pl-PL" sz="2400" dirty="0"/>
+              <a:t> of </a:t>
+            </a:r>
+            <a:r>
+              <a:rPr lang="pl-PL" sz="2400" dirty="0" err="1"/>
+              <a:t>api</a:t>
+            </a:r>
+            <a:r>
+              <a:rPr lang="pl-PL" sz="2400" dirty="0"/>
+              <a:t> </a:t>
+            </a:r>
+            <a:r>
+              <a:rPr lang="pl-PL" sz="2400" dirty="0" err="1"/>
+              <a:t>call</a:t>
+            </a:r>
+            <a:r>
+              <a:rPr lang="pl-PL" sz="2400" dirty="0"/>
+              <a:t> and top </a:t>
+            </a:r>
+            <a:r>
+              <a:rPr lang="pl-PL" sz="2400" dirty="0" err="1"/>
+              <a:t>word</a:t>
+            </a:r>
+            <a:r>
+              <a:rPr lang="pl-PL" sz="2400" dirty="0"/>
+              <a:t> </a:t>
+            </a:r>
+            <a:r>
+              <a:rPr lang="pl-PL" sz="2400" dirty="0" err="1"/>
+              <a:t>will</a:t>
+            </a:r>
+            <a:r>
+              <a:rPr lang="pl-PL" sz="2400" dirty="0"/>
+              <a:t> </a:t>
+            </a:r>
+            <a:r>
+              <a:rPr lang="pl-PL" sz="2400" dirty="0" err="1"/>
+              <a:t>change</a:t>
+            </a:r>
+            <a:r>
+              <a:rPr lang="pl-PL" sz="2400" dirty="0"/>
+              <a:t> to „online”.</a:t>
+            </a:r>
+          </a:p>
+          <a:p>
+            <a:pPr marL="0" indent="0">
+              <a:buNone/>
+            </a:pPr>
+            <a:r>
+              <a:rPr lang="pl-PL" sz="2400" dirty="0"/>
+              <a:t>Application </a:t>
+            </a:r>
+            <a:r>
+              <a:rPr lang="pl-PL" sz="2400" dirty="0" err="1"/>
+              <a:t>use</a:t>
+            </a:r>
+            <a:r>
+              <a:rPr lang="pl-PL" sz="2400" dirty="0"/>
+              <a:t> </a:t>
+            </a:r>
+            <a:r>
+              <a:rPr lang="pl-PL" sz="2400" dirty="0" err="1"/>
+              <a:t>following</a:t>
+            </a:r>
+            <a:r>
+              <a:rPr lang="pl-PL" sz="2400" dirty="0"/>
+              <a:t> </a:t>
+            </a:r>
+            <a:r>
+              <a:rPr lang="pl-PL" sz="2400" dirty="0" err="1"/>
+              <a:t>endpoint</a:t>
+            </a:r>
+            <a:r>
+              <a:rPr lang="pl-PL" sz="2400" dirty="0"/>
+              <a:t> to </a:t>
+            </a:r>
+            <a:r>
+              <a:rPr lang="pl-PL" sz="2400" dirty="0" err="1"/>
+              <a:t>fetch</a:t>
+            </a:r>
+            <a:r>
+              <a:rPr lang="pl-PL" sz="2400" dirty="0"/>
+              <a:t> </a:t>
+            </a:r>
+            <a:r>
+              <a:rPr lang="pl-PL" sz="2400" dirty="0" err="1"/>
+              <a:t>this</a:t>
+            </a:r>
+            <a:r>
+              <a:rPr lang="pl-PL" sz="2400" dirty="0"/>
+              <a:t> data:</a:t>
+            </a:r>
+          </a:p>
+          <a:p>
+            <a:pPr marL="0" indent="0">
+              <a:buNone/>
+            </a:pPr>
+            <a:r>
+              <a:rPr lang="pl-PL" sz="2400" dirty="0"/>
+              <a:t>https://tasks.googleapis.com/tasks/v1/users/@me/lists?fields=items.id,items.title</a:t>
+            </a:r>
+          </a:p>
+        </p:txBody>
+      </p:sp>
+      <p:pic>
+        <p:nvPicPr>
+          <p:cNvPr id="4" name="Picture 2">
+            <a:extLst>
+              <a:ext uri="{FF2B5EF4-FFF2-40B4-BE49-F238E27FC236}">
+                <a16:creationId xmlns:a16="http://schemas.microsoft.com/office/drawing/2014/main" id="{5C312A81-DF9F-E3DB-881E-68B57D639B8B}"/>
+              </a:ext>
+            </a:extLst>
+          </p:cNvPr>
+          <p:cNvPicPr>
+            <a:picLocks noChangeAspect="1" noChangeArrowheads="1"/>
+          </p:cNvPicPr>
+          <p:nvPr/>
+        </p:nvPicPr>
+        <p:blipFill>
+          <a:blip r:embed="rId2">
+            <a:extLst>
+              <a:ext uri="{28A0092B-C50C-407E-A947-70E740481C1C}">
+                <a14:useLocalDpi xmlns:a14="http://schemas.microsoft.com/office/drawing/2010/main" val="0"/>
+              </a:ext>
+            </a:extLst>
+          </a:blip>
+          <a:srcRect/>
+          <a:stretch>
+            <a:fillRect/>
+          </a:stretch>
+        </p:blipFill>
+        <p:spPr bwMode="auto">
+          <a:xfrm>
+            <a:off x="464697" y="1266825"/>
+            <a:ext cx="4324350" cy="4324350"/>
+          </a:xfrm>
+          <a:prstGeom prst="rect">
+            <a:avLst/>
+          </a:prstGeom>
+          <a:noFill/>
+          <a:extLst>
+            <a:ext uri="{909E8E84-426E-40DD-AFC4-6F175D3DCCD1}">
+              <a14:hiddenFill xmlns:a14="http://schemas.microsoft.com/office/drawing/2010/main">
+                <a:solidFill>
+                  <a:srgbClr val="FFFFFF"/>
+                </a:solidFill>
+              </a14:hiddenFill>
+            </a:ext>
+          </a:extLst>
+        </p:spPr>
+      </p:pic>
+      <p:sp>
+        <p:nvSpPr>
+          <p:cNvPr id="6" name="TextBox 5">
+            <a:extLst>
+              <a:ext uri="{FF2B5EF4-FFF2-40B4-BE49-F238E27FC236}">
+                <a16:creationId xmlns:a16="http://schemas.microsoft.com/office/drawing/2014/main" id="{9EB9E588-CEB3-D1E0-E7E0-18B253CFC60A}"/>
+              </a:ext>
+            </a:extLst>
+          </p:cNvPr>
+          <p:cNvSpPr txBox="1"/>
+          <p:nvPr/>
+        </p:nvSpPr>
+        <p:spPr>
+          <a:xfrm>
+            <a:off x="120814" y="5793166"/>
+            <a:ext cx="4625709" cy="646331"/>
+          </a:xfrm>
+          <a:prstGeom prst="rect">
+            <a:avLst/>
+          </a:prstGeom>
+          <a:noFill/>
+        </p:spPr>
+        <p:txBody>
+          <a:bodyPr wrap="square" rtlCol="0">
+            <a:spAutoFit/>
+          </a:bodyPr>
+          <a:lstStyle/>
+          <a:p>
+            <a:r>
+              <a:rPr lang="pl-PL" dirty="0" err="1"/>
+              <a:t>When</a:t>
+            </a:r>
+            <a:r>
+              <a:rPr lang="pl-PL" dirty="0"/>
+              <a:t> </a:t>
+            </a:r>
+            <a:r>
+              <a:rPr lang="pl-PL" dirty="0" err="1"/>
+              <a:t>user</a:t>
+            </a:r>
+            <a:r>
+              <a:rPr lang="pl-PL" dirty="0"/>
+              <a:t> </a:t>
+            </a:r>
+            <a:r>
+              <a:rPr lang="pl-PL" dirty="0" err="1"/>
+              <a:t>click</a:t>
+            </a:r>
+            <a:r>
+              <a:rPr lang="pl-PL" dirty="0"/>
+              <a:t> on a list </a:t>
+            </a:r>
+            <a:r>
+              <a:rPr lang="pl-PL" dirty="0" err="1"/>
+              <a:t>application</a:t>
+            </a:r>
+            <a:r>
+              <a:rPr lang="pl-PL" dirty="0"/>
+              <a:t> </a:t>
+            </a:r>
+            <a:r>
+              <a:rPr lang="pl-PL" dirty="0" err="1"/>
+              <a:t>will</a:t>
+            </a:r>
+            <a:r>
+              <a:rPr lang="pl-PL" dirty="0"/>
+              <a:t> go to „</a:t>
+            </a:r>
+            <a:r>
+              <a:rPr lang="pl-PL" dirty="0" err="1"/>
+              <a:t>Tasks</a:t>
+            </a:r>
+            <a:r>
+              <a:rPr lang="pl-PL" dirty="0"/>
+              <a:t>” </a:t>
+            </a:r>
+            <a:r>
+              <a:rPr lang="pl-PL" dirty="0" err="1"/>
+              <a:t>screen</a:t>
+            </a:r>
+            <a:r>
+              <a:rPr lang="pl-PL" dirty="0"/>
+              <a:t>.</a:t>
+            </a:r>
+          </a:p>
+        </p:txBody>
+      </p:sp>
+    </p:spTree>
+    <p:extLst>
+      <p:ext uri="{BB962C8B-B14F-4D97-AF65-F5344CB8AC3E}">
+        <p14:creationId xmlns:p14="http://schemas.microsoft.com/office/powerpoint/2010/main" val="349438496"/>
+      </p:ext>
+    </p:extLst>
+  </p:cSld>
+  <p:clrMapOvr>
+    <a:masterClrMapping/>
+  </p:clrMapOvr>
+</p:sld>
+</file>
+
+<file path=ppt/slides/slide14.xml><?xml version="1.0" encoding="utf-8"?>
+<p:sld xmlns:a="http://schemas.openxmlformats.org/drawingml/2006/main" xmlns:r="http://schemas.openxmlformats.org/officeDocument/2006/relationships" xmlns:p="http://schemas.openxmlformats.org/presentationml/2006/main">
+  <p:cSld>
+    <p:spTree>
+      <p:nvGrpSpPr>
+        <p:cNvPr id="1" name=""/>
+        <p:cNvGrpSpPr/>
+        <p:nvPr/>
+      </p:nvGrpSpPr>
+      <p:grpSpPr>
+        <a:xfrm>
+          <a:off x="0" y="0"/>
+          <a:ext cx="0" cy="0"/>
+          <a:chOff x="0" y="0"/>
+          <a:chExt cx="0" cy="0"/>
+        </a:xfrm>
+      </p:grpSpPr>
+      <p:sp>
+        <p:nvSpPr>
+          <p:cNvPr id="2" name="Title 1">
+            <a:extLst>
+              <a:ext uri="{FF2B5EF4-FFF2-40B4-BE49-F238E27FC236}">
+                <a16:creationId xmlns:a16="http://schemas.microsoft.com/office/drawing/2014/main" id="{BF505A78-6065-B07E-ADE1-4F3146545FE3}"/>
+              </a:ext>
+            </a:extLst>
+          </p:cNvPr>
+          <p:cNvSpPr>
+            <a:spLocks noGrp="1"/>
+          </p:cNvSpPr>
+          <p:nvPr>
+            <p:ph type="title"/>
+          </p:nvPr>
+        </p:nvSpPr>
+        <p:spPr>
+          <a:xfrm>
+            <a:off x="120814" y="129398"/>
+            <a:ext cx="7886700" cy="1325563"/>
+          </a:xfrm>
+        </p:spPr>
+        <p:txBody>
+          <a:bodyPr/>
+          <a:lstStyle/>
+          <a:p>
+            <a:r>
+              <a:rPr lang="pl-PL" dirty="0"/>
+              <a:t>Application </a:t>
+            </a:r>
+            <a:r>
+              <a:rPr lang="pl-PL" dirty="0" err="1"/>
+              <a:t>flow</a:t>
+            </a:r>
+            <a:r>
+              <a:rPr lang="pl-PL" dirty="0"/>
+              <a:t> for data </a:t>
+            </a:r>
+            <a:r>
+              <a:rPr lang="pl-PL" dirty="0" err="1"/>
+              <a:t>scopes</a:t>
+            </a:r>
+            <a:endParaRPr lang="pl-PL" dirty="0"/>
+          </a:p>
+        </p:txBody>
+      </p:sp>
+      <p:sp>
+        <p:nvSpPr>
+          <p:cNvPr id="3" name="Content Placeholder 2">
+            <a:extLst>
+              <a:ext uri="{FF2B5EF4-FFF2-40B4-BE49-F238E27FC236}">
+                <a16:creationId xmlns:a16="http://schemas.microsoft.com/office/drawing/2014/main" id="{B34717E9-3F5A-855A-B39B-D164B1FC795E}"/>
+              </a:ext>
+            </a:extLst>
+          </p:cNvPr>
+          <p:cNvSpPr>
+            <a:spLocks noGrp="1"/>
+          </p:cNvSpPr>
+          <p:nvPr>
+            <p:ph idx="1"/>
+          </p:nvPr>
+        </p:nvSpPr>
+        <p:spPr>
+          <a:xfrm>
+            <a:off x="4831571" y="1206193"/>
+            <a:ext cx="3970266" cy="5589864"/>
+          </a:xfrm>
+        </p:spPr>
+        <p:txBody>
+          <a:bodyPr>
+            <a:normAutofit lnSpcReduction="10000"/>
+          </a:bodyPr>
+          <a:lstStyle/>
+          <a:p>
+            <a:pPr marL="0" indent="0">
+              <a:buNone/>
+            </a:pPr>
+            <a:r>
+              <a:rPr lang="pl-PL" sz="2400" dirty="0" err="1"/>
+              <a:t>This</a:t>
+            </a:r>
+            <a:r>
+              <a:rPr lang="pl-PL" sz="2400" dirty="0"/>
+              <a:t> </a:t>
+            </a:r>
+            <a:r>
+              <a:rPr lang="pl-PL" sz="2400" dirty="0" err="1"/>
+              <a:t>is</a:t>
+            </a:r>
+            <a:r>
+              <a:rPr lang="pl-PL" sz="2400" dirty="0"/>
+              <a:t> </a:t>
+            </a:r>
+            <a:r>
+              <a:rPr lang="pl-PL" sz="2400" dirty="0" err="1"/>
+              <a:t>secondary</a:t>
+            </a:r>
+            <a:r>
+              <a:rPr lang="pl-PL" sz="2400" dirty="0"/>
+              <a:t> </a:t>
+            </a:r>
+            <a:r>
+              <a:rPr lang="pl-PL" sz="2400" dirty="0" err="1"/>
+              <a:t>screen</a:t>
+            </a:r>
+            <a:r>
+              <a:rPr lang="pl-PL" sz="2400" dirty="0"/>
+              <a:t> of the </a:t>
+            </a:r>
+            <a:r>
+              <a:rPr lang="pl-PL" sz="2400" dirty="0" err="1"/>
+              <a:t>application</a:t>
+            </a:r>
+            <a:r>
+              <a:rPr lang="pl-PL" sz="2400" dirty="0"/>
+              <a:t> </a:t>
+            </a:r>
+            <a:r>
+              <a:rPr lang="pl-PL" sz="2400" dirty="0" err="1"/>
+              <a:t>called</a:t>
+            </a:r>
+            <a:r>
+              <a:rPr lang="pl-PL" sz="2400" dirty="0"/>
+              <a:t> „</a:t>
+            </a:r>
+            <a:r>
+              <a:rPr lang="pl-PL" sz="2400" dirty="0" err="1"/>
+              <a:t>Lists</a:t>
+            </a:r>
+            <a:r>
+              <a:rPr lang="pl-PL" sz="2400" dirty="0"/>
+              <a:t>”.</a:t>
+            </a:r>
+          </a:p>
+          <a:p>
+            <a:pPr marL="0" indent="0">
+              <a:buNone/>
+            </a:pPr>
+            <a:r>
+              <a:rPr lang="pl-PL" sz="2400" dirty="0" err="1"/>
+              <a:t>During</a:t>
+            </a:r>
+            <a:r>
+              <a:rPr lang="pl-PL" sz="2400" dirty="0"/>
+              <a:t> start </a:t>
+            </a:r>
+            <a:r>
+              <a:rPr lang="pl-PL" sz="2400" dirty="0" err="1"/>
+              <a:t>it</a:t>
+            </a:r>
+            <a:r>
+              <a:rPr lang="pl-PL" sz="2400" dirty="0"/>
+              <a:t> </a:t>
+            </a:r>
+            <a:r>
+              <a:rPr lang="pl-PL" sz="2400" dirty="0" err="1"/>
+              <a:t>will</a:t>
+            </a:r>
+            <a:r>
+              <a:rPr lang="pl-PL" sz="2400" dirty="0"/>
+              <a:t> </a:t>
+            </a:r>
+            <a:r>
+              <a:rPr lang="pl-PL" sz="2400" dirty="0" err="1"/>
+              <a:t>call</a:t>
+            </a:r>
+            <a:r>
+              <a:rPr lang="pl-PL" sz="2400" dirty="0"/>
+              <a:t> </a:t>
+            </a:r>
+            <a:r>
+              <a:rPr lang="pl-PL" sz="2400" b="1" dirty="0"/>
+              <a:t>Google </a:t>
+            </a:r>
+            <a:r>
+              <a:rPr lang="pl-PL" sz="2400" b="1" dirty="0" err="1"/>
+              <a:t>Tasks</a:t>
+            </a:r>
+            <a:r>
+              <a:rPr lang="pl-PL" sz="2400" b="1" dirty="0"/>
+              <a:t> </a:t>
+            </a:r>
+            <a:r>
+              <a:rPr lang="pl-PL" sz="2400" b="1" dirty="0" err="1"/>
+              <a:t>api</a:t>
+            </a:r>
+            <a:r>
+              <a:rPr lang="pl-PL" sz="2400" dirty="0"/>
+              <a:t> and display </a:t>
+            </a:r>
+            <a:r>
+              <a:rPr lang="pl-PL" sz="2400" dirty="0" err="1"/>
+              <a:t>all</a:t>
+            </a:r>
+            <a:r>
+              <a:rPr lang="pl-PL" sz="2400" dirty="0"/>
+              <a:t> </a:t>
+            </a:r>
+            <a:r>
+              <a:rPr lang="pl-PL" sz="2400" dirty="0" err="1"/>
+              <a:t>tasks</a:t>
+            </a:r>
+            <a:r>
+              <a:rPr lang="pl-PL" sz="2400" dirty="0"/>
+              <a:t> </a:t>
+            </a:r>
+            <a:r>
+              <a:rPr lang="pl-PL" sz="2400" dirty="0" err="1"/>
+              <a:t>assigned</a:t>
+            </a:r>
+            <a:r>
+              <a:rPr lang="pl-PL" sz="2400" dirty="0"/>
+              <a:t> to list </a:t>
+            </a:r>
+            <a:r>
+              <a:rPr lang="pl-PL" sz="2400" dirty="0" err="1"/>
+              <a:t>selected</a:t>
+            </a:r>
+            <a:r>
+              <a:rPr lang="pl-PL" sz="2400" dirty="0"/>
+              <a:t> in </a:t>
+            </a:r>
+            <a:r>
+              <a:rPr lang="pl-PL" sz="2400" dirty="0" err="1"/>
+              <a:t>previous</a:t>
+            </a:r>
+            <a:r>
+              <a:rPr lang="pl-PL" sz="2400" dirty="0"/>
+              <a:t> </a:t>
+            </a:r>
+            <a:r>
+              <a:rPr lang="pl-PL" sz="2400" dirty="0" err="1"/>
+              <a:t>screen</a:t>
+            </a:r>
+            <a:r>
+              <a:rPr lang="pl-PL" sz="2400" dirty="0"/>
+              <a:t>. </a:t>
+            </a:r>
+            <a:r>
+              <a:rPr lang="pl-PL" sz="2400" dirty="0" err="1"/>
+              <a:t>Tasks</a:t>
+            </a:r>
+            <a:r>
+              <a:rPr lang="pl-PL" sz="2400" dirty="0"/>
+              <a:t> </a:t>
+            </a:r>
+            <a:r>
+              <a:rPr lang="pl-PL" sz="2400" dirty="0" err="1"/>
+              <a:t>are</a:t>
+            </a:r>
+            <a:r>
+              <a:rPr lang="pl-PL" sz="2400" dirty="0"/>
+              <a:t> </a:t>
+            </a:r>
+            <a:r>
+              <a:rPr lang="pl-PL" sz="2400" dirty="0" err="1"/>
+              <a:t>being</a:t>
+            </a:r>
+            <a:r>
+              <a:rPr lang="pl-PL" sz="2400" dirty="0"/>
+              <a:t> </a:t>
+            </a:r>
+            <a:r>
+              <a:rPr lang="pl-PL" sz="2400" dirty="0" err="1"/>
+              <a:t>saved</a:t>
+            </a:r>
+            <a:r>
+              <a:rPr lang="pl-PL" sz="2400" dirty="0"/>
+              <a:t> in smartwatch and </a:t>
+            </a:r>
+            <a:r>
+              <a:rPr lang="pl-PL" sz="2400" dirty="0" err="1"/>
+              <a:t>cached</a:t>
+            </a:r>
+            <a:r>
+              <a:rPr lang="pl-PL" sz="2400" dirty="0"/>
+              <a:t> same </a:t>
+            </a:r>
+            <a:r>
+              <a:rPr lang="pl-PL" sz="2400" dirty="0" err="1"/>
+              <a:t>way</a:t>
+            </a:r>
+            <a:r>
+              <a:rPr lang="pl-PL" sz="2400" dirty="0"/>
+              <a:t> as </a:t>
+            </a:r>
+            <a:r>
+              <a:rPr lang="pl-PL" sz="2400" dirty="0" err="1"/>
+              <a:t>lists</a:t>
+            </a:r>
+            <a:r>
+              <a:rPr lang="pl-PL" sz="2400" dirty="0"/>
+              <a:t>.</a:t>
+            </a:r>
+          </a:p>
+          <a:p>
+            <a:pPr marL="0" indent="0">
+              <a:buNone/>
+            </a:pPr>
+            <a:r>
+              <a:rPr lang="pl-PL" sz="2400" dirty="0"/>
+              <a:t>Application </a:t>
+            </a:r>
+            <a:r>
+              <a:rPr lang="pl-PL" sz="2400" dirty="0" err="1"/>
+              <a:t>use</a:t>
+            </a:r>
+            <a:r>
+              <a:rPr lang="pl-PL" sz="2400" dirty="0"/>
+              <a:t> </a:t>
+            </a:r>
+            <a:r>
+              <a:rPr lang="pl-PL" sz="2400" dirty="0" err="1"/>
+              <a:t>following</a:t>
+            </a:r>
+            <a:r>
+              <a:rPr lang="pl-PL" sz="2400" dirty="0"/>
+              <a:t> </a:t>
+            </a:r>
+            <a:r>
+              <a:rPr lang="pl-PL" sz="2400" dirty="0" err="1"/>
+              <a:t>endpoint</a:t>
+            </a:r>
+            <a:r>
+              <a:rPr lang="pl-PL" sz="2400" dirty="0"/>
+              <a:t> to </a:t>
+            </a:r>
+            <a:r>
+              <a:rPr lang="pl-PL" sz="2400" dirty="0" err="1"/>
+              <a:t>fetch</a:t>
+            </a:r>
+            <a:r>
+              <a:rPr lang="pl-PL" sz="2400" dirty="0"/>
+              <a:t> </a:t>
+            </a:r>
+            <a:r>
+              <a:rPr lang="pl-PL" sz="2400" dirty="0" err="1"/>
+              <a:t>this</a:t>
+            </a:r>
+            <a:r>
+              <a:rPr lang="pl-PL" sz="2400" dirty="0"/>
+              <a:t> data:</a:t>
+            </a:r>
+          </a:p>
+          <a:p>
+            <a:pPr marL="0" indent="0">
+              <a:buNone/>
+            </a:pPr>
+            <a:r>
+              <a:rPr lang="pl-PL" sz="2400" dirty="0"/>
+              <a:t>https://tasks.googleapis.com/tasks/v1/lists/</a:t>
+            </a:r>
+            <a:r>
+              <a:rPr lang="pl-PL" sz="2400" u="sng" dirty="0"/>
+              <a:t>${listId}</a:t>
+            </a:r>
+            <a:r>
+              <a:rPr lang="pl-PL" sz="2400" dirty="0"/>
+              <a:t>/tasks?showCompleted=false&amp;fields=items.id,items.title </a:t>
+            </a:r>
+          </a:p>
+          <a:p>
+            <a:pPr marL="0" indent="0">
+              <a:buNone/>
+            </a:pPr>
+            <a:r>
+              <a:rPr lang="pl-PL" sz="2400" u="sng" dirty="0"/>
+              <a:t>${</a:t>
+            </a:r>
+            <a:r>
+              <a:rPr lang="pl-PL" sz="2400" u="sng" dirty="0" err="1"/>
+              <a:t>listId</a:t>
+            </a:r>
+            <a:r>
+              <a:rPr lang="pl-PL" sz="2400" u="sng" dirty="0"/>
+              <a:t>}</a:t>
+            </a:r>
+            <a:r>
+              <a:rPr lang="pl-PL" sz="2400" dirty="0"/>
+              <a:t> -&gt; list </a:t>
+            </a:r>
+            <a:r>
+              <a:rPr lang="pl-PL" sz="2400" dirty="0" err="1"/>
+              <a:t>selected</a:t>
+            </a:r>
+            <a:r>
+              <a:rPr lang="pl-PL" sz="2400" dirty="0"/>
+              <a:t> on </a:t>
+            </a:r>
+            <a:r>
+              <a:rPr lang="pl-PL" sz="2400" dirty="0" err="1"/>
+              <a:t>previous</a:t>
+            </a:r>
+            <a:r>
+              <a:rPr lang="pl-PL" sz="2400" dirty="0"/>
+              <a:t> </a:t>
+            </a:r>
+            <a:r>
+              <a:rPr lang="pl-PL" sz="2400" dirty="0" err="1"/>
+              <a:t>screen</a:t>
+            </a:r>
+            <a:endParaRPr lang="pl-PL" sz="2400" dirty="0"/>
+          </a:p>
+        </p:txBody>
+      </p:sp>
+      <p:pic>
+        <p:nvPicPr>
+          <p:cNvPr id="4" name="Picture 2">
+            <a:extLst>
+              <a:ext uri="{FF2B5EF4-FFF2-40B4-BE49-F238E27FC236}">
+                <a16:creationId xmlns:a16="http://schemas.microsoft.com/office/drawing/2014/main" id="{5C312A81-DF9F-E3DB-881E-68B57D639B8B}"/>
+              </a:ext>
+            </a:extLst>
+          </p:cNvPr>
+          <p:cNvPicPr>
+            <a:picLocks noChangeAspect="1" noChangeArrowheads="1"/>
+          </p:cNvPicPr>
+          <p:nvPr/>
+        </p:nvPicPr>
+        <p:blipFill>
+          <a:blip r:embed="rId2">
+            <a:extLst>
+              <a:ext uri="{28A0092B-C50C-407E-A947-70E740481C1C}">
+                <a14:useLocalDpi xmlns:a14="http://schemas.microsoft.com/office/drawing/2010/main" val="0"/>
+              </a:ext>
+            </a:extLst>
+          </a:blip>
+          <a:srcRect/>
+          <a:stretch/>
+        </p:blipFill>
+        <p:spPr bwMode="auto">
+          <a:xfrm>
+            <a:off x="464697" y="1269870"/>
+            <a:ext cx="4324350" cy="4318259"/>
+          </a:xfrm>
+          <a:prstGeom prst="rect">
+            <a:avLst/>
+          </a:prstGeom>
+          <a:noFill/>
+          <a:extLst>
+            <a:ext uri="{909E8E84-426E-40DD-AFC4-6F175D3DCCD1}">
+              <a14:hiddenFill xmlns:a14="http://schemas.microsoft.com/office/drawing/2010/main">
+                <a:solidFill>
+                  <a:srgbClr val="FFFFFF"/>
+                </a:solidFill>
+              </a14:hiddenFill>
+            </a:ext>
+          </a:extLst>
+        </p:spPr>
+      </p:pic>
+    </p:spTree>
+    <p:extLst>
+      <p:ext uri="{BB962C8B-B14F-4D97-AF65-F5344CB8AC3E}">
+        <p14:creationId xmlns:p14="http://schemas.microsoft.com/office/powerpoint/2010/main" val="3273866507"/>
+      </p:ext>
+    </p:extLst>
+  </p:cSld>
+  <p:clrMapOvr>
+    <a:masterClrMapping/>
+  </p:clrMapOvr>
+</p:sld>
+</file>
+
+<file path=ppt/slides/slide15.xml><?xml version="1.0" encoding="utf-8"?>
+<p:sld xmlns:a="http://schemas.openxmlformats.org/drawingml/2006/main" xmlns:r="http://schemas.openxmlformats.org/officeDocument/2006/relationships" xmlns:p="http://schemas.openxmlformats.org/presentationml/2006/main">
+  <p:cSld>
+    <p:spTree>
+      <p:nvGrpSpPr>
+        <p:cNvPr id="1" name=""/>
+        <p:cNvGrpSpPr/>
+        <p:nvPr/>
+      </p:nvGrpSpPr>
+      <p:grpSpPr>
+        <a:xfrm>
+          <a:off x="0" y="0"/>
+          <a:ext cx="0" cy="0"/>
+          <a:chOff x="0" y="0"/>
+          <a:chExt cx="0" cy="0"/>
+        </a:xfrm>
+      </p:grpSpPr>
+      <p:sp>
+        <p:nvSpPr>
+          <p:cNvPr id="2" name="Title 1">
+            <a:extLst>
+              <a:ext uri="{FF2B5EF4-FFF2-40B4-BE49-F238E27FC236}">
+                <a16:creationId xmlns:a16="http://schemas.microsoft.com/office/drawing/2014/main" id="{BF505A78-6065-B07E-ADE1-4F3146545FE3}"/>
+              </a:ext>
+            </a:extLst>
+          </p:cNvPr>
+          <p:cNvSpPr>
+            <a:spLocks noGrp="1"/>
+          </p:cNvSpPr>
+          <p:nvPr>
+            <p:ph type="title"/>
+          </p:nvPr>
+        </p:nvSpPr>
+        <p:spPr>
+          <a:xfrm>
+            <a:off x="120814" y="129398"/>
+            <a:ext cx="7886700" cy="1325563"/>
+          </a:xfrm>
+        </p:spPr>
+        <p:txBody>
+          <a:bodyPr/>
+          <a:lstStyle/>
+          <a:p>
+            <a:r>
+              <a:rPr lang="pl-PL" dirty="0"/>
+              <a:t>Application </a:t>
+            </a:r>
+            <a:r>
+              <a:rPr lang="pl-PL" dirty="0" err="1"/>
+              <a:t>flow</a:t>
+            </a:r>
+            <a:r>
+              <a:rPr lang="pl-PL" dirty="0"/>
+              <a:t> for data </a:t>
+            </a:r>
+            <a:r>
+              <a:rPr lang="pl-PL" dirty="0" err="1"/>
+              <a:t>scopes</a:t>
+            </a:r>
+            <a:endParaRPr lang="pl-PL" dirty="0"/>
+          </a:p>
+        </p:txBody>
+      </p:sp>
+      <p:sp>
+        <p:nvSpPr>
+          <p:cNvPr id="3" name="Content Placeholder 2">
+            <a:extLst>
+              <a:ext uri="{FF2B5EF4-FFF2-40B4-BE49-F238E27FC236}">
+                <a16:creationId xmlns:a16="http://schemas.microsoft.com/office/drawing/2014/main" id="{B34717E9-3F5A-855A-B39B-D164B1FC795E}"/>
+              </a:ext>
+            </a:extLst>
+          </p:cNvPr>
+          <p:cNvSpPr>
+            <a:spLocks noGrp="1"/>
+          </p:cNvSpPr>
+          <p:nvPr>
+            <p:ph idx="1"/>
+          </p:nvPr>
+        </p:nvSpPr>
+        <p:spPr>
+          <a:xfrm>
+            <a:off x="4831571" y="1206193"/>
+            <a:ext cx="3970266" cy="5589864"/>
+          </a:xfrm>
+        </p:spPr>
+        <p:txBody>
+          <a:bodyPr>
+            <a:normAutofit/>
+          </a:bodyPr>
+          <a:lstStyle/>
+          <a:p>
+            <a:pPr marL="0" indent="0">
+              <a:buNone/>
+            </a:pPr>
+            <a:r>
+              <a:rPr lang="pl-PL" sz="2400" dirty="0" err="1"/>
+              <a:t>When</a:t>
+            </a:r>
+            <a:r>
+              <a:rPr lang="pl-PL" sz="2400" dirty="0"/>
+              <a:t> </a:t>
+            </a:r>
+            <a:r>
+              <a:rPr lang="pl-PL" sz="2400" dirty="0" err="1"/>
+              <a:t>user</a:t>
+            </a:r>
+            <a:r>
+              <a:rPr lang="pl-PL" sz="2400" dirty="0"/>
+              <a:t> </a:t>
+            </a:r>
+            <a:r>
+              <a:rPr lang="pl-PL" sz="2400" dirty="0" err="1"/>
+              <a:t>click</a:t>
+            </a:r>
+            <a:r>
+              <a:rPr lang="pl-PL" sz="2400" dirty="0"/>
+              <a:t> on a </a:t>
+            </a:r>
+            <a:r>
+              <a:rPr lang="pl-PL" sz="2400" dirty="0" err="1"/>
+              <a:t>task</a:t>
+            </a:r>
+            <a:r>
+              <a:rPr lang="pl-PL" sz="2400" dirty="0"/>
+              <a:t> </a:t>
+            </a:r>
+            <a:r>
+              <a:rPr lang="pl-PL" sz="2400" dirty="0" err="1"/>
+              <a:t>it</a:t>
+            </a:r>
+            <a:r>
+              <a:rPr lang="pl-PL" sz="2400" dirty="0"/>
+              <a:t> </a:t>
+            </a:r>
+            <a:r>
+              <a:rPr lang="pl-PL" sz="2400" dirty="0" err="1"/>
+              <a:t>will</a:t>
+            </a:r>
+            <a:r>
+              <a:rPr lang="pl-PL" sz="2400" dirty="0"/>
+              <a:t> be </a:t>
+            </a:r>
+            <a:r>
+              <a:rPr lang="pl-PL" sz="2400" dirty="0" err="1"/>
+              <a:t>deleted</a:t>
+            </a:r>
+            <a:r>
+              <a:rPr lang="pl-PL" sz="2400" dirty="0"/>
+              <a:t> from display list, and </a:t>
+            </a:r>
+            <a:r>
+              <a:rPr lang="pl-PL" sz="2400" dirty="0" err="1"/>
+              <a:t>it</a:t>
+            </a:r>
+            <a:r>
+              <a:rPr lang="pl-PL" sz="2400" dirty="0"/>
+              <a:t> </a:t>
+            </a:r>
+            <a:r>
+              <a:rPr lang="pl-PL" sz="2400" dirty="0" err="1"/>
+              <a:t>will</a:t>
+            </a:r>
+            <a:r>
+              <a:rPr lang="pl-PL" sz="2400" dirty="0"/>
+              <a:t> </a:t>
+            </a:r>
+            <a:r>
+              <a:rPr lang="pl-PL" sz="2400" dirty="0" err="1"/>
+              <a:t>send</a:t>
+            </a:r>
+            <a:r>
+              <a:rPr lang="pl-PL" sz="2400" dirty="0"/>
+              <a:t> PUT </a:t>
+            </a:r>
+            <a:r>
+              <a:rPr lang="pl-PL" sz="2400" dirty="0" err="1"/>
+              <a:t>request</a:t>
+            </a:r>
+            <a:r>
+              <a:rPr lang="pl-PL" sz="2400" dirty="0"/>
+              <a:t> to </a:t>
+            </a:r>
+            <a:r>
+              <a:rPr lang="pl-PL" sz="2400" b="1" dirty="0"/>
+              <a:t>Google </a:t>
+            </a:r>
+            <a:r>
+              <a:rPr lang="pl-PL" sz="2400" b="1" dirty="0" err="1"/>
+              <a:t>Tasks</a:t>
+            </a:r>
+            <a:r>
+              <a:rPr lang="pl-PL" sz="2400" b="1" dirty="0"/>
+              <a:t> API </a:t>
+            </a:r>
+            <a:r>
+              <a:rPr lang="pl-PL" sz="2400" dirty="0"/>
+              <a:t>to </a:t>
+            </a:r>
+            <a:r>
+              <a:rPr lang="pl-PL" sz="2400" dirty="0" err="1"/>
+              <a:t>complete</a:t>
+            </a:r>
+            <a:r>
+              <a:rPr lang="pl-PL" sz="2400" dirty="0"/>
+              <a:t> </a:t>
+            </a:r>
+            <a:r>
+              <a:rPr lang="pl-PL" sz="2400" dirty="0" err="1"/>
+              <a:t>it</a:t>
+            </a:r>
+            <a:r>
+              <a:rPr lang="pl-PL" sz="2400" dirty="0"/>
+              <a:t>. </a:t>
+            </a:r>
+          </a:p>
+          <a:p>
+            <a:pPr marL="0" indent="0">
+              <a:buNone/>
+            </a:pPr>
+            <a:r>
+              <a:rPr lang="pl-PL" sz="2400" dirty="0"/>
+              <a:t>It </a:t>
+            </a:r>
+            <a:r>
+              <a:rPr lang="pl-PL" sz="2400" dirty="0" err="1"/>
+              <a:t>will</a:t>
+            </a:r>
+            <a:r>
+              <a:rPr lang="pl-PL" sz="2400" dirty="0"/>
+              <a:t> </a:t>
+            </a:r>
+            <a:r>
+              <a:rPr lang="pl-PL" sz="2400" dirty="0" err="1"/>
+              <a:t>use</a:t>
+            </a:r>
+            <a:r>
+              <a:rPr lang="pl-PL" sz="2400" dirty="0"/>
+              <a:t> </a:t>
+            </a:r>
+            <a:r>
+              <a:rPr lang="pl-PL" sz="2400" dirty="0" err="1"/>
+              <a:t>following</a:t>
+            </a:r>
+            <a:r>
+              <a:rPr lang="pl-PL" sz="2400" dirty="0"/>
+              <a:t> </a:t>
+            </a:r>
+            <a:r>
+              <a:rPr lang="pl-PL" sz="2400" dirty="0" err="1"/>
+              <a:t>endpoint</a:t>
+            </a:r>
+            <a:r>
+              <a:rPr lang="pl-PL" sz="2400" dirty="0"/>
+              <a:t> to do </a:t>
+            </a:r>
+            <a:r>
+              <a:rPr lang="pl-PL" sz="2400" dirty="0" err="1"/>
+              <a:t>this</a:t>
+            </a:r>
+            <a:r>
+              <a:rPr lang="pl-PL" sz="2400" dirty="0"/>
+              <a:t>:</a:t>
+            </a:r>
+          </a:p>
+          <a:p>
+            <a:pPr marL="0" indent="0">
+              <a:buNone/>
+            </a:pPr>
+            <a:r>
+              <a:rPr lang="pl-PL" sz="2400" dirty="0"/>
+              <a:t>https://tasks.googleapis.com/tasks/v1/lists/${listId}/tasks/${task.id}</a:t>
+            </a:r>
+          </a:p>
+          <a:p>
+            <a:pPr marL="0" indent="0">
+              <a:buNone/>
+            </a:pPr>
+            <a:r>
+              <a:rPr lang="pl-PL" sz="2400" dirty="0" err="1"/>
+              <a:t>Request</a:t>
+            </a:r>
+            <a:r>
+              <a:rPr lang="pl-PL" sz="2400" dirty="0"/>
+              <a:t> body:</a:t>
+            </a:r>
+          </a:p>
+          <a:p>
+            <a:pPr marL="0" indent="0">
+              <a:buNone/>
+            </a:pPr>
+            <a:r>
+              <a:rPr lang="en-US" sz="2400" dirty="0"/>
+              <a:t>{id: task.id, title: </a:t>
+            </a:r>
+            <a:r>
+              <a:rPr lang="en-US" sz="2400" dirty="0" err="1"/>
+              <a:t>task.title</a:t>
+            </a:r>
+            <a:r>
+              <a:rPr lang="en-US" sz="2400" dirty="0"/>
+              <a:t>, status: 'completed’}</a:t>
+            </a:r>
+            <a:br>
+              <a:rPr lang="pl-PL" sz="2400" dirty="0"/>
+            </a:br>
+            <a:endParaRPr lang="pl-PL" sz="2400" dirty="0"/>
+          </a:p>
+        </p:txBody>
+      </p:sp>
+      <p:pic>
+        <p:nvPicPr>
+          <p:cNvPr id="4" name="Picture 2">
+            <a:extLst>
+              <a:ext uri="{FF2B5EF4-FFF2-40B4-BE49-F238E27FC236}">
+                <a16:creationId xmlns:a16="http://schemas.microsoft.com/office/drawing/2014/main" id="{5C312A81-DF9F-E3DB-881E-68B57D639B8B}"/>
+              </a:ext>
+            </a:extLst>
+          </p:cNvPr>
+          <p:cNvPicPr>
+            <a:picLocks noChangeAspect="1" noChangeArrowheads="1"/>
+          </p:cNvPicPr>
+          <p:nvPr/>
+        </p:nvPicPr>
+        <p:blipFill>
+          <a:blip r:embed="rId2">
+            <a:extLst>
+              <a:ext uri="{28A0092B-C50C-407E-A947-70E740481C1C}">
+                <a14:useLocalDpi xmlns:a14="http://schemas.microsoft.com/office/drawing/2010/main" val="0"/>
+              </a:ext>
+            </a:extLst>
+          </a:blip>
+          <a:srcRect/>
+          <a:stretch/>
+        </p:blipFill>
+        <p:spPr bwMode="auto">
+          <a:xfrm>
+            <a:off x="464697" y="1269870"/>
+            <a:ext cx="4324350" cy="4318259"/>
+          </a:xfrm>
+          <a:prstGeom prst="rect">
+            <a:avLst/>
+          </a:prstGeom>
+          <a:noFill/>
+          <a:extLst>
+            <a:ext uri="{909E8E84-426E-40DD-AFC4-6F175D3DCCD1}">
+              <a14:hiddenFill xmlns:a14="http://schemas.microsoft.com/office/drawing/2010/main">
+                <a:solidFill>
+                  <a:srgbClr val="FFFFFF"/>
+                </a:solidFill>
+              </a14:hiddenFill>
+            </a:ext>
+          </a:extLst>
+        </p:spPr>
+      </p:pic>
+    </p:spTree>
+    <p:extLst>
+      <p:ext uri="{BB962C8B-B14F-4D97-AF65-F5344CB8AC3E}">
+        <p14:creationId xmlns:p14="http://schemas.microsoft.com/office/powerpoint/2010/main" val="3680562626"/>
+      </p:ext>
+    </p:extLst>
+  </p:cSld>
+  <p:clrMapOvr>
+    <a:masterClrMapping/>
+  </p:clrMapOvr>
+</p:sld>
+</file>
+
+<file path=ppt/slides/slide16.xml><?xml version="1.0" encoding="utf-8"?>
+<p:sld xmlns:a="http://schemas.openxmlformats.org/drawingml/2006/main" xmlns:r="http://schemas.openxmlformats.org/officeDocument/2006/relationships" xmlns:p="http://schemas.openxmlformats.org/presentationml/2006/main">
+  <p:cSld>
+    <p:spTree>
+      <p:nvGrpSpPr>
+        <p:cNvPr id="1" name=""/>
+        <p:cNvGrpSpPr/>
+        <p:nvPr/>
+      </p:nvGrpSpPr>
+      <p:grpSpPr>
+        <a:xfrm>
+          <a:off x="0" y="0"/>
+          <a:ext cx="0" cy="0"/>
+          <a:chOff x="0" y="0"/>
+          <a:chExt cx="0" cy="0"/>
+        </a:xfrm>
+      </p:grpSpPr>
+      <p:sp>
+        <p:nvSpPr>
+          <p:cNvPr id="2" name="Title 1">
+            <a:extLst>
+              <a:ext uri="{FF2B5EF4-FFF2-40B4-BE49-F238E27FC236}">
+                <a16:creationId xmlns:a16="http://schemas.microsoft.com/office/drawing/2014/main" id="{BF505A78-6065-B07E-ADE1-4F3146545FE3}"/>
+              </a:ext>
+            </a:extLst>
+          </p:cNvPr>
+          <p:cNvSpPr>
+            <a:spLocks noGrp="1"/>
+          </p:cNvSpPr>
+          <p:nvPr>
+            <p:ph type="title"/>
+          </p:nvPr>
+        </p:nvSpPr>
+        <p:spPr>
+          <a:xfrm>
+            <a:off x="120814" y="129398"/>
+            <a:ext cx="7886700" cy="1325563"/>
+          </a:xfrm>
+        </p:spPr>
+        <p:txBody>
+          <a:bodyPr/>
+          <a:lstStyle/>
+          <a:p>
+            <a:r>
+              <a:rPr lang="pl-PL" dirty="0"/>
+              <a:t>Application </a:t>
+            </a:r>
+            <a:r>
+              <a:rPr lang="pl-PL" dirty="0" err="1"/>
+              <a:t>flow</a:t>
+            </a:r>
+            <a:r>
+              <a:rPr lang="pl-PL" dirty="0"/>
+              <a:t> for data </a:t>
+            </a:r>
+            <a:r>
+              <a:rPr lang="pl-PL" dirty="0" err="1"/>
+              <a:t>scopes</a:t>
+            </a:r>
+            <a:endParaRPr lang="pl-PL" dirty="0"/>
+          </a:p>
+        </p:txBody>
+      </p:sp>
+      <p:sp>
+        <p:nvSpPr>
+          <p:cNvPr id="3" name="Content Placeholder 2">
+            <a:extLst>
+              <a:ext uri="{FF2B5EF4-FFF2-40B4-BE49-F238E27FC236}">
+                <a16:creationId xmlns:a16="http://schemas.microsoft.com/office/drawing/2014/main" id="{B34717E9-3F5A-855A-B39B-D164B1FC795E}"/>
+              </a:ext>
+            </a:extLst>
+          </p:cNvPr>
+          <p:cNvSpPr>
+            <a:spLocks noGrp="1"/>
+          </p:cNvSpPr>
+          <p:nvPr>
+            <p:ph idx="1"/>
+          </p:nvPr>
+        </p:nvSpPr>
+        <p:spPr>
+          <a:xfrm>
+            <a:off x="802312" y="1206193"/>
+            <a:ext cx="7999525" cy="5589864"/>
+          </a:xfrm>
+        </p:spPr>
+        <p:txBody>
+          <a:bodyPr>
+            <a:normAutofit/>
+          </a:bodyPr>
+          <a:lstStyle/>
+          <a:p>
+            <a:pPr marL="0" indent="0">
+              <a:buNone/>
+            </a:pPr>
+            <a:r>
+              <a:rPr lang="pl-PL" sz="2400" dirty="0"/>
+              <a:t>Data </a:t>
+            </a:r>
+            <a:r>
+              <a:rPr lang="pl-PL" sz="2400" dirty="0" err="1"/>
+              <a:t>retention</a:t>
+            </a:r>
+            <a:r>
+              <a:rPr lang="pl-PL" sz="2400" dirty="0"/>
+              <a:t> in smartwatch:</a:t>
+            </a:r>
+          </a:p>
+          <a:p>
+            <a:r>
+              <a:rPr lang="pl-PL" sz="2400" dirty="0" err="1"/>
+              <a:t>all</a:t>
+            </a:r>
+            <a:r>
+              <a:rPr lang="pl-PL" sz="2400" dirty="0"/>
+              <a:t> data </a:t>
+            </a:r>
+            <a:r>
+              <a:rPr lang="pl-PL" sz="2400" dirty="0" err="1"/>
+              <a:t>saved</a:t>
+            </a:r>
+            <a:r>
+              <a:rPr lang="pl-PL" sz="2400" dirty="0"/>
+              <a:t> in </a:t>
+            </a:r>
+            <a:r>
+              <a:rPr lang="pl-PL" sz="2400" dirty="0" err="1"/>
+              <a:t>watch</a:t>
+            </a:r>
+            <a:r>
+              <a:rPr lang="pl-PL" sz="2400" dirty="0"/>
+              <a:t> </a:t>
+            </a:r>
+            <a:r>
+              <a:rPr lang="pl-PL" sz="2400" dirty="0" err="1"/>
+              <a:t>is</a:t>
+            </a:r>
+            <a:r>
+              <a:rPr lang="pl-PL" sz="2400" dirty="0"/>
+              <a:t> </a:t>
+            </a:r>
+            <a:r>
+              <a:rPr lang="pl-PL" sz="2400" dirty="0" err="1"/>
+              <a:t>deleted</a:t>
+            </a:r>
+            <a:r>
+              <a:rPr lang="pl-PL" sz="2400" dirty="0"/>
+              <a:t> </a:t>
+            </a:r>
+            <a:r>
+              <a:rPr lang="pl-PL" sz="2400" dirty="0" err="1"/>
+              <a:t>when</a:t>
+            </a:r>
+            <a:r>
+              <a:rPr lang="pl-PL" sz="2400" dirty="0"/>
+              <a:t> </a:t>
+            </a:r>
+            <a:r>
+              <a:rPr lang="pl-PL" sz="2400" dirty="0" err="1"/>
+              <a:t>user</a:t>
+            </a:r>
+            <a:r>
+              <a:rPr lang="pl-PL" sz="2400" dirty="0"/>
+              <a:t> </a:t>
+            </a:r>
+            <a:r>
+              <a:rPr lang="pl-PL" sz="2400" dirty="0" err="1"/>
+              <a:t>unstall</a:t>
+            </a:r>
+            <a:r>
+              <a:rPr lang="pl-PL" sz="2400" dirty="0"/>
+              <a:t> </a:t>
+            </a:r>
+            <a:r>
+              <a:rPr lang="pl-PL" sz="2400" dirty="0" err="1"/>
+              <a:t>application</a:t>
+            </a:r>
+            <a:endParaRPr lang="pl-PL" sz="2400" dirty="0"/>
+          </a:p>
+          <a:p>
+            <a:r>
+              <a:rPr lang="pl-PL" sz="2400" dirty="0"/>
+              <a:t>For extra </a:t>
+            </a:r>
+            <a:r>
+              <a:rPr lang="pl-PL" sz="2400" dirty="0" err="1"/>
+              <a:t>security</a:t>
+            </a:r>
+            <a:r>
+              <a:rPr lang="pl-PL" sz="2400" dirty="0"/>
+              <a:t> </a:t>
+            </a:r>
+            <a:r>
+              <a:rPr lang="pl-PL" sz="2400" dirty="0" err="1"/>
+              <a:t>user</a:t>
+            </a:r>
+            <a:r>
+              <a:rPr lang="pl-PL" sz="2400" dirty="0"/>
+              <a:t> </a:t>
+            </a:r>
+            <a:r>
+              <a:rPr lang="pl-PL" sz="2400" dirty="0" err="1"/>
+              <a:t>have</a:t>
+            </a:r>
+            <a:r>
+              <a:rPr lang="pl-PL" sz="2400" dirty="0"/>
+              <a:t> buton </a:t>
+            </a:r>
+            <a:r>
+              <a:rPr lang="pl-PL" sz="2400" dirty="0" err="1"/>
+              <a:t>which</a:t>
+            </a:r>
+            <a:r>
+              <a:rPr lang="pl-PL" sz="2400" dirty="0"/>
+              <a:t> </a:t>
+            </a:r>
+            <a:r>
+              <a:rPr lang="pl-PL" sz="2400" dirty="0" err="1"/>
+              <a:t>will</a:t>
+            </a:r>
+            <a:r>
+              <a:rPr lang="pl-PL" sz="2400" dirty="0"/>
+              <a:t> </a:t>
+            </a:r>
+            <a:r>
+              <a:rPr lang="pl-PL" sz="2400" dirty="0" err="1"/>
+              <a:t>remove</a:t>
+            </a:r>
+            <a:r>
+              <a:rPr lang="pl-PL" sz="2400" dirty="0"/>
+              <a:t> </a:t>
+            </a:r>
+            <a:r>
+              <a:rPr lang="pl-PL" sz="2400" dirty="0" err="1"/>
+              <a:t>google</a:t>
+            </a:r>
+            <a:r>
+              <a:rPr lang="pl-PL" sz="2400" dirty="0"/>
+              <a:t> </a:t>
+            </a:r>
+            <a:r>
+              <a:rPr lang="pl-PL" sz="2400" dirty="0" err="1"/>
+              <a:t>auth</a:t>
+            </a:r>
+            <a:r>
+              <a:rPr lang="pl-PL" sz="2400" dirty="0"/>
+              <a:t> </a:t>
+            </a:r>
+            <a:r>
+              <a:rPr lang="pl-PL" sz="2400" dirty="0" err="1"/>
+              <a:t>token</a:t>
+            </a:r>
+            <a:r>
+              <a:rPr lang="pl-PL" sz="2400" dirty="0"/>
+              <a:t> from </a:t>
+            </a:r>
+            <a:r>
+              <a:rPr lang="pl-PL" sz="2400" dirty="0" err="1"/>
+              <a:t>device</a:t>
+            </a:r>
+            <a:endParaRPr lang="pl-PL" sz="2400" dirty="0"/>
+          </a:p>
+        </p:txBody>
+      </p:sp>
+    </p:spTree>
+    <p:extLst>
+      <p:ext uri="{BB962C8B-B14F-4D97-AF65-F5344CB8AC3E}">
+        <p14:creationId xmlns:p14="http://schemas.microsoft.com/office/powerpoint/2010/main" val="515801029"/>
+      </p:ext>
+    </p:extLst>
+  </p:cSld>
+  <p:clrMapOvr>
+    <a:masterClrMapping/>
+  </p:clrMapOvr>
+</p:sld>
+</file>
+
+<file path=ppt/slides/slide17.xml><?xml version="1.0" encoding="utf-8"?>
+<p:sld xmlns:a="http://schemas.openxmlformats.org/drawingml/2006/main" xmlns:r="http://schemas.openxmlformats.org/officeDocument/2006/relationships" xmlns:p="http://schemas.openxmlformats.org/presentationml/2006/main">
+  <p:cSld>
+    <p:spTree>
+      <p:nvGrpSpPr>
+        <p:cNvPr id="1" name=""/>
+        <p:cNvGrpSpPr/>
+        <p:nvPr/>
+      </p:nvGrpSpPr>
+      <p:grpSpPr>
+        <a:xfrm>
+          <a:off x="0" y="0"/>
+          <a:ext cx="0" cy="0"/>
+          <a:chOff x="0" y="0"/>
+          <a:chExt cx="0" cy="0"/>
+        </a:xfrm>
+      </p:grpSpPr>
+      <p:sp>
+        <p:nvSpPr>
+          <p:cNvPr id="2" name="Title 1">
+            <a:extLst>
+              <a:ext uri="{FF2B5EF4-FFF2-40B4-BE49-F238E27FC236}">
                 <a16:creationId xmlns:a16="http://schemas.microsoft.com/office/drawing/2014/main" id="{B6E198A8-1746-E227-C346-6FD3A1C3066E}"/>
               </a:ext>
             </a:extLst>
@@ -5352,9 +7152,8 @@
               </a:ext>
             </a:extLst>
           </a:blip>
-          <a:stretch>
-            <a:fillRect/>
-          </a:stretch>
+          <a:srcRect/>
+          <a:stretch/>
         </p:blipFill>
         <p:spPr>
           <a:xfrm>
@@ -5379,8 +7178,8 @@
         </p:nvCxnSpPr>
         <p:spPr>
           <a:xfrm flipH="1">
-            <a:off x="1211580" y="590103"/>
-            <a:ext cx="2202180" cy="369332"/>
+            <a:off x="1681316" y="590103"/>
+            <a:ext cx="1732444" cy="323165"/>
           </a:xfrm>
           <a:prstGeom prst="straightConnector1">
             <a:avLst/>
@@ -5515,8 +7314,8 @@
         </p:nvCxnSpPr>
         <p:spPr>
           <a:xfrm flipH="1">
-            <a:off x="1211580" y="3505200"/>
-            <a:ext cx="2286000" cy="479375"/>
+            <a:off x="1150374" y="3505200"/>
+            <a:ext cx="2347206" cy="1414862"/>
           </a:xfrm>
           <a:prstGeom prst="straightConnector1">
             <a:avLst/>
@@ -5691,6 +7490,123 @@
             <a:r>
               <a:rPr lang="pl-PL" dirty="0" err="1"/>
               <a:t>revoked</a:t>
+            </a:r>
+            <a:endParaRPr lang="pl-PL" dirty="0"/>
+          </a:p>
+        </p:txBody>
+      </p:sp>
+      <p:cxnSp>
+        <p:nvCxnSpPr>
+          <p:cNvPr id="2" name="Straight Arrow Connector 1">
+            <a:extLst>
+              <a:ext uri="{FF2B5EF4-FFF2-40B4-BE49-F238E27FC236}">
+                <a16:creationId xmlns:a16="http://schemas.microsoft.com/office/drawing/2014/main" id="{67897118-91A0-1EC1-ABD8-20F3FF438881}"/>
+              </a:ext>
+            </a:extLst>
+          </p:cNvPr>
+          <p:cNvCxnSpPr>
+            <a:cxnSpLocks/>
+          </p:cNvCxnSpPr>
+          <p:nvPr/>
+        </p:nvCxnSpPr>
+        <p:spPr>
+          <a:xfrm flipH="1" flipV="1">
+            <a:off x="2354580" y="1594313"/>
+            <a:ext cx="2217420" cy="617168"/>
+          </a:xfrm>
+          <a:prstGeom prst="straightConnector1">
+            <a:avLst/>
+          </a:prstGeom>
+          <a:ln w="120650">
+            <a:tailEnd type="triangle"/>
+          </a:ln>
+        </p:spPr>
+        <p:style>
+          <a:lnRef idx="3">
+            <a:schemeClr val="accent2"/>
+          </a:lnRef>
+          <a:fillRef idx="0">
+            <a:schemeClr val="accent2"/>
+          </a:fillRef>
+          <a:effectRef idx="2">
+            <a:schemeClr val="accent2"/>
+          </a:effectRef>
+          <a:fontRef idx="minor">
+            <a:schemeClr val="tx1"/>
+          </a:fontRef>
+        </p:style>
+      </p:cxnSp>
+      <p:sp>
+        <p:nvSpPr>
+          <p:cNvPr id="4" name="TextBox 3">
+            <a:extLst>
+              <a:ext uri="{FF2B5EF4-FFF2-40B4-BE49-F238E27FC236}">
+                <a16:creationId xmlns:a16="http://schemas.microsoft.com/office/drawing/2014/main" id="{C1DD7917-FA8E-C28B-7A76-6A05B97C5939}"/>
+              </a:ext>
+            </a:extLst>
+          </p:cNvPr>
+          <p:cNvSpPr txBox="1"/>
+          <p:nvPr/>
+        </p:nvSpPr>
+        <p:spPr>
+          <a:xfrm>
+            <a:off x="4580112" y="1812644"/>
+            <a:ext cx="3736013" cy="646331"/>
+          </a:xfrm>
+          <a:prstGeom prst="rect">
+            <a:avLst/>
+          </a:prstGeom>
+          <a:noFill/>
+        </p:spPr>
+        <p:txBody>
+          <a:bodyPr wrap="square" rtlCol="0">
+            <a:spAutoFit/>
+          </a:bodyPr>
+          <a:lstStyle/>
+          <a:p>
+            <a:r>
+              <a:rPr lang="pl-PL" dirty="0" err="1"/>
+              <a:t>This</a:t>
+            </a:r>
+            <a:r>
+              <a:rPr lang="pl-PL" dirty="0"/>
+              <a:t> buton </a:t>
+            </a:r>
+            <a:r>
+              <a:rPr lang="pl-PL" dirty="0" err="1"/>
+              <a:t>will</a:t>
+            </a:r>
+            <a:r>
+              <a:rPr lang="pl-PL" dirty="0"/>
+              <a:t> </a:t>
+            </a:r>
+            <a:r>
+              <a:rPr lang="pl-PL" dirty="0" err="1"/>
+              <a:t>remove</a:t>
+            </a:r>
+            <a:r>
+              <a:rPr lang="pl-PL" dirty="0"/>
+              <a:t> </a:t>
+            </a:r>
+            <a:r>
+              <a:rPr lang="pl-PL" dirty="0" err="1"/>
+              <a:t>current</a:t>
+            </a:r>
+            <a:r>
+              <a:rPr lang="pl-PL" dirty="0"/>
+              <a:t> </a:t>
+            </a:r>
+            <a:r>
+              <a:rPr lang="pl-PL" dirty="0" err="1"/>
+              <a:t>authentication</a:t>
+            </a:r>
+            <a:r>
+              <a:rPr lang="pl-PL" dirty="0"/>
+              <a:t> from </a:t>
+            </a:r>
+            <a:r>
+              <a:rPr lang="pl-PL" dirty="0" err="1"/>
+              <a:t>device</a:t>
             </a:r>
             <a:endParaRPr lang="pl-PL" dirty="0"/>
           </a:p>
@@ -5989,7 +7905,7 @@
         </p:nvSpPr>
         <p:spPr>
           <a:xfrm>
-            <a:off x="3619500" y="2249269"/>
+            <a:off x="3926266" y="2733016"/>
             <a:ext cx="5120640" cy="369332"/>
           </a:xfrm>
           <a:prstGeom prst="rect">
@@ -6117,9 +8033,8 @@
               </a:ext>
             </a:extLst>
           </a:blip>
-          <a:stretch>
-            <a:fillRect/>
-          </a:stretch>
+          <a:srcRect/>
+          <a:stretch/>
         </p:blipFill>
         <p:spPr>
           <a:xfrm>

</xml_diff>